<commit_message>
Adicionando link do repositorio
</commit_message>
<xml_diff>
--- a/Meetup-SignalR.pptx
+++ b/Meetup-SignalR.pptx
@@ -15,6 +15,7 @@
     <p:sldId id="262" r:id="rId9"/>
     <p:sldId id="265" r:id="rId10"/>
     <p:sldId id="264" r:id="rId11"/>
+    <p:sldId id="267" r:id="rId12"/>
   </p:sldIdLst>
   <p:sldSz cx="12192000" cy="6858000"/>
   <p:notesSz cx="6858000" cy="9144000"/>
@@ -113,6 +114,11 @@
       </a:defRPr>
     </a:lvl9pPr>
   </p:defaultTextStyle>
+  <p:extLst>
+    <p:ext uri="{EFAFB233-063F-42B5-8137-9DF3F51BA10A}">
+      <p15:sldGuideLst xmlns:p15="http://schemas.microsoft.com/office/powerpoint/2012/main"/>
+    </p:ext>
+  </p:extLst>
 </p:presentation>
 </file>
 
@@ -6142,6 +6148,64 @@
 </p:sld>
 </file>
 
+<file path=ppt/slides/slide11.xml><?xml version="1.0" encoding="utf-8"?>
+<p:sld xmlns:a="http://schemas.openxmlformats.org/drawingml/2006/main" xmlns:r="http://schemas.openxmlformats.org/officeDocument/2006/relationships" xmlns:p="http://schemas.openxmlformats.org/presentationml/2006/main">
+  <p:cSld>
+    <p:spTree>
+      <p:nvGrpSpPr>
+        <p:cNvPr id="1" name=""/>
+        <p:cNvGrpSpPr/>
+        <p:nvPr/>
+      </p:nvGrpSpPr>
+      <p:grpSpPr>
+        <a:xfrm>
+          <a:off x="0" y="0"/>
+          <a:ext cx="0" cy="0"/>
+          <a:chOff x="0" y="0"/>
+          <a:chExt cx="0" cy="0"/>
+        </a:xfrm>
+      </p:grpSpPr>
+      <p:sp>
+        <p:nvSpPr>
+          <p:cNvPr id="3" name="Espaço Reservado para Conteúdo 2">
+            <a:extLst>
+              <a:ext uri="{FF2B5EF4-FFF2-40B4-BE49-F238E27FC236}">
+                <a16:creationId xmlns:a16="http://schemas.microsoft.com/office/drawing/2014/main" id="{2AD13A70-2310-428F-94BE-AB6BCC2DEAE8}"/>
+              </a:ext>
+            </a:extLst>
+          </p:cNvPr>
+          <p:cNvSpPr>
+            <a:spLocks noGrp="1"/>
+          </p:cNvSpPr>
+          <p:nvPr>
+            <p:ph idx="1"/>
+          </p:nvPr>
+        </p:nvSpPr>
+        <p:spPr/>
+        <p:txBody>
+          <a:bodyPr/>
+          <a:lstStyle/>
+          <a:p>
+            <a:r>
+              <a:rPr lang="pt-BR" dirty="0"/>
+              <a:t>https://github.com/gmalaquias/meetup-signalR</a:t>
+            </a:r>
+          </a:p>
+        </p:txBody>
+      </p:sp>
+    </p:spTree>
+    <p:extLst>
+      <p:ext uri="{BB962C8B-B14F-4D97-AF65-F5344CB8AC3E}">
+        <p14:creationId xmlns:p14="http://schemas.microsoft.com/office/powerpoint/2010/main" val="2751477890"/>
+      </p:ext>
+    </p:extLst>
+  </p:cSld>
+  <p:clrMapOvr>
+    <a:masterClrMapping/>
+  </p:clrMapOvr>
+</p:sld>
+</file>
+
 <file path=ppt/slides/slide2.xml><?xml version="1.0" encoding="utf-8"?>
 <p:sld xmlns:a="http://schemas.openxmlformats.org/drawingml/2006/main" xmlns:r="http://schemas.openxmlformats.org/officeDocument/2006/relationships" xmlns:p="http://schemas.openxmlformats.org/presentationml/2006/main">
   <p:cSld>
@@ -6409,8 +6473,8 @@
           </a:prstGeom>
         </p:spPr>
       </p:pic>
-      <mc:AlternateContent xmlns:mc="http://schemas.openxmlformats.org/markup-compatibility/2006">
-        <mc:Choice xmlns:p14="http://schemas.microsoft.com/office/powerpoint/2010/main" Requires="p14">
+      <mc:AlternateContent xmlns:mc="http://schemas.openxmlformats.org/markup-compatibility/2006" xmlns:p14="http://schemas.microsoft.com/office/powerpoint/2010/main">
+        <mc:Choice Requires="p14">
           <p:contentPart p14:bwMode="auto" r:id="rId3">
             <p14:nvContentPartPr>
               <p14:cNvPr id="77" name="Tinta 76">
@@ -6429,7 +6493,7 @@
             </p14:xfrm>
           </p:contentPart>
         </mc:Choice>
-        <mc:Fallback>
+        <mc:Fallback xmlns="">
           <p:pic>
             <p:nvPicPr>
               <p:cNvPr id="77" name="Tinta 76">
@@ -6531,8 +6595,8 @@
             <a:chExt cx="597600" cy="362520"/>
           </a:xfrm>
         </p:grpSpPr>
-        <mc:AlternateContent xmlns:mc="http://schemas.openxmlformats.org/markup-compatibility/2006">
-          <mc:Choice xmlns:p14="http://schemas.microsoft.com/office/powerpoint/2010/main" Requires="p14">
+        <mc:AlternateContent xmlns:mc="http://schemas.openxmlformats.org/markup-compatibility/2006" xmlns:p14="http://schemas.microsoft.com/office/powerpoint/2010/main">
+          <mc:Choice Requires="p14">
             <p:contentPart p14:bwMode="auto" r:id="rId5">
               <p14:nvContentPartPr>
                 <p14:cNvPr id="79" name="Tinta 78">
@@ -6551,7 +6615,7 @@
               </p14:xfrm>
             </p:contentPart>
           </mc:Choice>
-          <mc:Fallback>
+          <mc:Fallback xmlns="">
             <p:pic>
               <p:nvPicPr>
                 <p:cNvPr id="79" name="Tinta 78">
@@ -6582,8 +6646,8 @@
             </p:pic>
           </mc:Fallback>
         </mc:AlternateContent>
-        <mc:AlternateContent xmlns:mc="http://schemas.openxmlformats.org/markup-compatibility/2006">
-          <mc:Choice xmlns:p14="http://schemas.microsoft.com/office/powerpoint/2010/main" Requires="p14">
+        <mc:AlternateContent xmlns:mc="http://schemas.openxmlformats.org/markup-compatibility/2006" xmlns:p14="http://schemas.microsoft.com/office/powerpoint/2010/main">
+          <mc:Choice Requires="p14">
             <p:contentPart p14:bwMode="auto" r:id="rId7">
               <p14:nvContentPartPr>
                 <p14:cNvPr id="80" name="Tinta 79">
@@ -6602,7 +6666,7 @@
               </p14:xfrm>
             </p:contentPart>
           </mc:Choice>
-          <mc:Fallback>
+          <mc:Fallback xmlns="">
             <p:pic>
               <p:nvPicPr>
                 <p:cNvPr id="80" name="Tinta 79">
@@ -6633,8 +6697,8 @@
             </p:pic>
           </mc:Fallback>
         </mc:AlternateContent>
-        <mc:AlternateContent xmlns:mc="http://schemas.openxmlformats.org/markup-compatibility/2006">
-          <mc:Choice xmlns:p14="http://schemas.microsoft.com/office/powerpoint/2010/main" Requires="p14">
+        <mc:AlternateContent xmlns:mc="http://schemas.openxmlformats.org/markup-compatibility/2006" xmlns:p14="http://schemas.microsoft.com/office/powerpoint/2010/main">
+          <mc:Choice Requires="p14">
             <p:contentPart p14:bwMode="auto" r:id="rId9">
               <p14:nvContentPartPr>
                 <p14:cNvPr id="81" name="Tinta 80">
@@ -6653,7 +6717,7 @@
               </p14:xfrm>
             </p:contentPart>
           </mc:Choice>
-          <mc:Fallback>
+          <mc:Fallback xmlns="">
             <p:pic>
               <p:nvPicPr>
                 <p:cNvPr id="81" name="Tinta 80">
@@ -6684,8 +6748,8 @@
             </p:pic>
           </mc:Fallback>
         </mc:AlternateContent>
-        <mc:AlternateContent xmlns:mc="http://schemas.openxmlformats.org/markup-compatibility/2006">
-          <mc:Choice xmlns:p14="http://schemas.microsoft.com/office/powerpoint/2010/main" Requires="p14">
+        <mc:AlternateContent xmlns:mc="http://schemas.openxmlformats.org/markup-compatibility/2006" xmlns:p14="http://schemas.microsoft.com/office/powerpoint/2010/main">
+          <mc:Choice Requires="p14">
             <p:contentPart p14:bwMode="auto" r:id="rId11">
               <p14:nvContentPartPr>
                 <p14:cNvPr id="82" name="Tinta 81">
@@ -6704,7 +6768,7 @@
               </p14:xfrm>
             </p:contentPart>
           </mc:Choice>
-          <mc:Fallback>
+          <mc:Fallback xmlns="">
             <p:pic>
               <p:nvPicPr>
                 <p:cNvPr id="82" name="Tinta 81">
@@ -6735,8 +6799,8 @@
             </p:pic>
           </mc:Fallback>
         </mc:AlternateContent>
-        <mc:AlternateContent xmlns:mc="http://schemas.openxmlformats.org/markup-compatibility/2006">
-          <mc:Choice xmlns:p14="http://schemas.microsoft.com/office/powerpoint/2010/main" Requires="p14">
+        <mc:AlternateContent xmlns:mc="http://schemas.openxmlformats.org/markup-compatibility/2006" xmlns:p14="http://schemas.microsoft.com/office/powerpoint/2010/main">
+          <mc:Choice Requires="p14">
             <p:contentPart p14:bwMode="auto" r:id="rId13">
               <p14:nvContentPartPr>
                 <p14:cNvPr id="83" name="Tinta 82">
@@ -6755,7 +6819,7 @@
               </p14:xfrm>
             </p:contentPart>
           </mc:Choice>
-          <mc:Fallback>
+          <mc:Fallback xmlns="">
             <p:pic>
               <p:nvPicPr>
                 <p:cNvPr id="83" name="Tinta 82">
@@ -6807,8 +6871,8 @@
             <a:chExt cx="1086480" cy="330480"/>
           </a:xfrm>
         </p:grpSpPr>
-        <mc:AlternateContent xmlns:mc="http://schemas.openxmlformats.org/markup-compatibility/2006">
-          <mc:Choice xmlns:p14="http://schemas.microsoft.com/office/powerpoint/2010/main" Requires="p14">
+        <mc:AlternateContent xmlns:mc="http://schemas.openxmlformats.org/markup-compatibility/2006" xmlns:p14="http://schemas.microsoft.com/office/powerpoint/2010/main">
+          <mc:Choice Requires="p14">
             <p:contentPart p14:bwMode="auto" r:id="rId15">
               <p14:nvContentPartPr>
                 <p14:cNvPr id="88" name="Tinta 87">
@@ -6827,7 +6891,7 @@
               </p14:xfrm>
             </p:contentPart>
           </mc:Choice>
-          <mc:Fallback>
+          <mc:Fallback xmlns="">
             <p:pic>
               <p:nvPicPr>
                 <p:cNvPr id="88" name="Tinta 87">
@@ -6858,8 +6922,8 @@
             </p:pic>
           </mc:Fallback>
         </mc:AlternateContent>
-        <mc:AlternateContent xmlns:mc="http://schemas.openxmlformats.org/markup-compatibility/2006">
-          <mc:Choice xmlns:p14="http://schemas.microsoft.com/office/powerpoint/2010/main" Requires="p14">
+        <mc:AlternateContent xmlns:mc="http://schemas.openxmlformats.org/markup-compatibility/2006" xmlns:p14="http://schemas.microsoft.com/office/powerpoint/2010/main">
+          <mc:Choice Requires="p14">
             <p:contentPart p14:bwMode="auto" r:id="rId17">
               <p14:nvContentPartPr>
                 <p14:cNvPr id="89" name="Tinta 88">
@@ -6878,7 +6942,7 @@
               </p14:xfrm>
             </p:contentPart>
           </mc:Choice>
-          <mc:Fallback>
+          <mc:Fallback xmlns="">
             <p:pic>
               <p:nvPicPr>
                 <p:cNvPr id="89" name="Tinta 88">
@@ -6909,8 +6973,8 @@
             </p:pic>
           </mc:Fallback>
         </mc:AlternateContent>
-        <mc:AlternateContent xmlns:mc="http://schemas.openxmlformats.org/markup-compatibility/2006">
-          <mc:Choice xmlns:p14="http://schemas.microsoft.com/office/powerpoint/2010/main" Requires="p14">
+        <mc:AlternateContent xmlns:mc="http://schemas.openxmlformats.org/markup-compatibility/2006" xmlns:p14="http://schemas.microsoft.com/office/powerpoint/2010/main">
+          <mc:Choice Requires="p14">
             <p:contentPart p14:bwMode="auto" r:id="rId19">
               <p14:nvContentPartPr>
                 <p14:cNvPr id="90" name="Tinta 89">
@@ -6929,7 +6993,7 @@
               </p14:xfrm>
             </p:contentPart>
           </mc:Choice>
-          <mc:Fallback>
+          <mc:Fallback xmlns="">
             <p:pic>
               <p:nvPicPr>
                 <p:cNvPr id="90" name="Tinta 89">
@@ -6960,8 +7024,8 @@
             </p:pic>
           </mc:Fallback>
         </mc:AlternateContent>
-        <mc:AlternateContent xmlns:mc="http://schemas.openxmlformats.org/markup-compatibility/2006">
-          <mc:Choice xmlns:p14="http://schemas.microsoft.com/office/powerpoint/2010/main" Requires="p14">
+        <mc:AlternateContent xmlns:mc="http://schemas.openxmlformats.org/markup-compatibility/2006" xmlns:p14="http://schemas.microsoft.com/office/powerpoint/2010/main">
+          <mc:Choice Requires="p14">
             <p:contentPart p14:bwMode="auto" r:id="rId21">
               <p14:nvContentPartPr>
                 <p14:cNvPr id="91" name="Tinta 90">
@@ -6980,7 +7044,7 @@
               </p14:xfrm>
             </p:contentPart>
           </mc:Choice>
-          <mc:Fallback>
+          <mc:Fallback xmlns="">
             <p:pic>
               <p:nvPicPr>
                 <p:cNvPr id="91" name="Tinta 90">
@@ -7011,8 +7075,8 @@
             </p:pic>
           </mc:Fallback>
         </mc:AlternateContent>
-        <mc:AlternateContent xmlns:mc="http://schemas.openxmlformats.org/markup-compatibility/2006">
-          <mc:Choice xmlns:p14="http://schemas.microsoft.com/office/powerpoint/2010/main" Requires="p14">
+        <mc:AlternateContent xmlns:mc="http://schemas.openxmlformats.org/markup-compatibility/2006" xmlns:p14="http://schemas.microsoft.com/office/powerpoint/2010/main">
+          <mc:Choice Requires="p14">
             <p:contentPart p14:bwMode="auto" r:id="rId23">
               <p14:nvContentPartPr>
                 <p14:cNvPr id="92" name="Tinta 91">
@@ -7031,7 +7095,7 @@
               </p14:xfrm>
             </p:contentPart>
           </mc:Choice>
-          <mc:Fallback>
+          <mc:Fallback xmlns="">
             <p:pic>
               <p:nvPicPr>
                 <p:cNvPr id="92" name="Tinta 91">
@@ -7062,8 +7126,8 @@
             </p:pic>
           </mc:Fallback>
         </mc:AlternateContent>
-        <mc:AlternateContent xmlns:mc="http://schemas.openxmlformats.org/markup-compatibility/2006">
-          <mc:Choice xmlns:p14="http://schemas.microsoft.com/office/powerpoint/2010/main" Requires="p14">
+        <mc:AlternateContent xmlns:mc="http://schemas.openxmlformats.org/markup-compatibility/2006" xmlns:p14="http://schemas.microsoft.com/office/powerpoint/2010/main">
+          <mc:Choice Requires="p14">
             <p:contentPart p14:bwMode="auto" r:id="rId25">
               <p14:nvContentPartPr>
                 <p14:cNvPr id="93" name="Tinta 92">
@@ -7082,7 +7146,7 @@
               </p14:xfrm>
             </p:contentPart>
           </mc:Choice>
-          <mc:Fallback>
+          <mc:Fallback xmlns="">
             <p:pic>
               <p:nvPicPr>
                 <p:cNvPr id="93" name="Tinta 92">
@@ -7113,8 +7177,8 @@
             </p:pic>
           </mc:Fallback>
         </mc:AlternateContent>
-        <mc:AlternateContent xmlns:mc="http://schemas.openxmlformats.org/markup-compatibility/2006">
-          <mc:Choice xmlns:p14="http://schemas.microsoft.com/office/powerpoint/2010/main" Requires="p14">
+        <mc:AlternateContent xmlns:mc="http://schemas.openxmlformats.org/markup-compatibility/2006" xmlns:p14="http://schemas.microsoft.com/office/powerpoint/2010/main">
+          <mc:Choice Requires="p14">
             <p:contentPart p14:bwMode="auto" r:id="rId27">
               <p14:nvContentPartPr>
                 <p14:cNvPr id="94" name="Tinta 93">
@@ -7133,7 +7197,7 @@
               </p14:xfrm>
             </p:contentPart>
           </mc:Choice>
-          <mc:Fallback>
+          <mc:Fallback xmlns="">
             <p:pic>
               <p:nvPicPr>
                 <p:cNvPr id="94" name="Tinta 93">
@@ -7164,8 +7228,8 @@
             </p:pic>
           </mc:Fallback>
         </mc:AlternateContent>
-        <mc:AlternateContent xmlns:mc="http://schemas.openxmlformats.org/markup-compatibility/2006">
-          <mc:Choice xmlns:p14="http://schemas.microsoft.com/office/powerpoint/2010/main" Requires="p14">
+        <mc:AlternateContent xmlns:mc="http://schemas.openxmlformats.org/markup-compatibility/2006" xmlns:p14="http://schemas.microsoft.com/office/powerpoint/2010/main">
+          <mc:Choice Requires="p14">
             <p:contentPart p14:bwMode="auto" r:id="rId29">
               <p14:nvContentPartPr>
                 <p14:cNvPr id="95" name="Tinta 94">
@@ -7184,7 +7248,7 @@
               </p14:xfrm>
             </p:contentPart>
           </mc:Choice>
-          <mc:Fallback>
+          <mc:Fallback xmlns="">
             <p:pic>
               <p:nvPicPr>
                 <p:cNvPr id="95" name="Tinta 94">
@@ -7215,8 +7279,8 @@
             </p:pic>
           </mc:Fallback>
         </mc:AlternateContent>
-        <mc:AlternateContent xmlns:mc="http://schemas.openxmlformats.org/markup-compatibility/2006">
-          <mc:Choice xmlns:p14="http://schemas.microsoft.com/office/powerpoint/2010/main" Requires="p14">
+        <mc:AlternateContent xmlns:mc="http://schemas.openxmlformats.org/markup-compatibility/2006" xmlns:p14="http://schemas.microsoft.com/office/powerpoint/2010/main">
+          <mc:Choice Requires="p14">
             <p:contentPart p14:bwMode="auto" r:id="rId31">
               <p14:nvContentPartPr>
                 <p14:cNvPr id="128" name="Tinta 127">
@@ -7235,7 +7299,7 @@
               </p14:xfrm>
             </p:contentPart>
           </mc:Choice>
-          <mc:Fallback>
+          <mc:Fallback xmlns="">
             <p:pic>
               <p:nvPicPr>
                 <p:cNvPr id="128" name="Tinta 127">
@@ -7287,8 +7351,8 @@
             <a:chExt cx="699840" cy="149400"/>
           </a:xfrm>
         </p:grpSpPr>
-        <mc:AlternateContent xmlns:mc="http://schemas.openxmlformats.org/markup-compatibility/2006">
-          <mc:Choice xmlns:p14="http://schemas.microsoft.com/office/powerpoint/2010/main" Requires="p14">
+        <mc:AlternateContent xmlns:mc="http://schemas.openxmlformats.org/markup-compatibility/2006" xmlns:p14="http://schemas.microsoft.com/office/powerpoint/2010/main">
+          <mc:Choice Requires="p14">
             <p:contentPart p14:bwMode="auto" r:id="rId33">
               <p14:nvContentPartPr>
                 <p14:cNvPr id="131" name="Tinta 130">
@@ -7307,7 +7371,7 @@
               </p14:xfrm>
             </p:contentPart>
           </mc:Choice>
-          <mc:Fallback>
+          <mc:Fallback xmlns="">
             <p:pic>
               <p:nvPicPr>
                 <p:cNvPr id="131" name="Tinta 130">
@@ -7338,8 +7402,8 @@
             </p:pic>
           </mc:Fallback>
         </mc:AlternateContent>
-        <mc:AlternateContent xmlns:mc="http://schemas.openxmlformats.org/markup-compatibility/2006">
-          <mc:Choice xmlns:p14="http://schemas.microsoft.com/office/powerpoint/2010/main" Requires="p14">
+        <mc:AlternateContent xmlns:mc="http://schemas.openxmlformats.org/markup-compatibility/2006" xmlns:p14="http://schemas.microsoft.com/office/powerpoint/2010/main">
+          <mc:Choice Requires="p14">
             <p:contentPart p14:bwMode="auto" r:id="rId35">
               <p14:nvContentPartPr>
                 <p14:cNvPr id="132" name="Tinta 131">
@@ -7358,7 +7422,7 @@
               </p14:xfrm>
             </p:contentPart>
           </mc:Choice>
-          <mc:Fallback>
+          <mc:Fallback xmlns="">
             <p:pic>
               <p:nvPicPr>
                 <p:cNvPr id="132" name="Tinta 131">
@@ -7389,8 +7453,8 @@
             </p:pic>
           </mc:Fallback>
         </mc:AlternateContent>
-        <mc:AlternateContent xmlns:mc="http://schemas.openxmlformats.org/markup-compatibility/2006">
-          <mc:Choice xmlns:p14="http://schemas.microsoft.com/office/powerpoint/2010/main" Requires="p14">
+        <mc:AlternateContent xmlns:mc="http://schemas.openxmlformats.org/markup-compatibility/2006" xmlns:p14="http://schemas.microsoft.com/office/powerpoint/2010/main">
+          <mc:Choice Requires="p14">
             <p:contentPart p14:bwMode="auto" r:id="rId37">
               <p14:nvContentPartPr>
                 <p14:cNvPr id="133" name="Tinta 132">
@@ -7409,7 +7473,7 @@
               </p14:xfrm>
             </p:contentPart>
           </mc:Choice>
-          <mc:Fallback>
+          <mc:Fallback xmlns="">
             <p:pic>
               <p:nvPicPr>
                 <p:cNvPr id="133" name="Tinta 132">
@@ -7461,8 +7525,8 @@
             <a:chExt cx="1367280" cy="352440"/>
           </a:xfrm>
         </p:grpSpPr>
-        <mc:AlternateContent xmlns:mc="http://schemas.openxmlformats.org/markup-compatibility/2006">
-          <mc:Choice xmlns:p14="http://schemas.microsoft.com/office/powerpoint/2010/main" Requires="p14">
+        <mc:AlternateContent xmlns:mc="http://schemas.openxmlformats.org/markup-compatibility/2006" xmlns:p14="http://schemas.microsoft.com/office/powerpoint/2010/main">
+          <mc:Choice Requires="p14">
             <p:contentPart p14:bwMode="auto" r:id="rId39">
               <p14:nvContentPartPr>
                 <p14:cNvPr id="134" name="Tinta 133">
@@ -7481,7 +7545,7 @@
               </p14:xfrm>
             </p:contentPart>
           </mc:Choice>
-          <mc:Fallback>
+          <mc:Fallback xmlns="">
             <p:pic>
               <p:nvPicPr>
                 <p:cNvPr id="134" name="Tinta 133">
@@ -7512,8 +7576,8 @@
             </p:pic>
           </mc:Fallback>
         </mc:AlternateContent>
-        <mc:AlternateContent xmlns:mc="http://schemas.openxmlformats.org/markup-compatibility/2006">
-          <mc:Choice xmlns:p14="http://schemas.microsoft.com/office/powerpoint/2010/main" Requires="p14">
+        <mc:AlternateContent xmlns:mc="http://schemas.openxmlformats.org/markup-compatibility/2006" xmlns:p14="http://schemas.microsoft.com/office/powerpoint/2010/main">
+          <mc:Choice Requires="p14">
             <p:contentPart p14:bwMode="auto" r:id="rId41">
               <p14:nvContentPartPr>
                 <p14:cNvPr id="135" name="Tinta 134">
@@ -7532,7 +7596,7 @@
               </p14:xfrm>
             </p:contentPart>
           </mc:Choice>
-          <mc:Fallback>
+          <mc:Fallback xmlns="">
             <p:pic>
               <p:nvPicPr>
                 <p:cNvPr id="135" name="Tinta 134">
@@ -7563,8 +7627,8 @@
             </p:pic>
           </mc:Fallback>
         </mc:AlternateContent>
-        <mc:AlternateContent xmlns:mc="http://schemas.openxmlformats.org/markup-compatibility/2006">
-          <mc:Choice xmlns:p14="http://schemas.microsoft.com/office/powerpoint/2010/main" Requires="p14">
+        <mc:AlternateContent xmlns:mc="http://schemas.openxmlformats.org/markup-compatibility/2006" xmlns:p14="http://schemas.microsoft.com/office/powerpoint/2010/main">
+          <mc:Choice Requires="p14">
             <p:contentPart p14:bwMode="auto" r:id="rId43">
               <p14:nvContentPartPr>
                 <p14:cNvPr id="136" name="Tinta 135">
@@ -7583,7 +7647,7 @@
               </p14:xfrm>
             </p:contentPart>
           </mc:Choice>
-          <mc:Fallback>
+          <mc:Fallback xmlns="">
             <p:pic>
               <p:nvPicPr>
                 <p:cNvPr id="136" name="Tinta 135">
@@ -7614,8 +7678,8 @@
             </p:pic>
           </mc:Fallback>
         </mc:AlternateContent>
-        <mc:AlternateContent xmlns:mc="http://schemas.openxmlformats.org/markup-compatibility/2006">
-          <mc:Choice xmlns:p14="http://schemas.microsoft.com/office/powerpoint/2010/main" Requires="p14">
+        <mc:AlternateContent xmlns:mc="http://schemas.openxmlformats.org/markup-compatibility/2006" xmlns:p14="http://schemas.microsoft.com/office/powerpoint/2010/main">
+          <mc:Choice Requires="p14">
             <p:contentPart p14:bwMode="auto" r:id="rId45">
               <p14:nvContentPartPr>
                 <p14:cNvPr id="137" name="Tinta 136">
@@ -7634,7 +7698,7 @@
               </p14:xfrm>
             </p:contentPart>
           </mc:Choice>
-          <mc:Fallback>
+          <mc:Fallback xmlns="">
             <p:pic>
               <p:nvPicPr>
                 <p:cNvPr id="137" name="Tinta 136">
@@ -7665,8 +7729,8 @@
             </p:pic>
           </mc:Fallback>
         </mc:AlternateContent>
-        <mc:AlternateContent xmlns:mc="http://schemas.openxmlformats.org/markup-compatibility/2006">
-          <mc:Choice xmlns:p14="http://schemas.microsoft.com/office/powerpoint/2010/main" Requires="p14">
+        <mc:AlternateContent xmlns:mc="http://schemas.openxmlformats.org/markup-compatibility/2006" xmlns:p14="http://schemas.microsoft.com/office/powerpoint/2010/main">
+          <mc:Choice Requires="p14">
             <p:contentPart p14:bwMode="auto" r:id="rId47">
               <p14:nvContentPartPr>
                 <p14:cNvPr id="138" name="Tinta 137">
@@ -7685,7 +7749,7 @@
               </p14:xfrm>
             </p:contentPart>
           </mc:Choice>
-          <mc:Fallback>
+          <mc:Fallback xmlns="">
             <p:pic>
               <p:nvPicPr>
                 <p:cNvPr id="138" name="Tinta 137">
@@ -7716,8 +7780,8 @@
             </p:pic>
           </mc:Fallback>
         </mc:AlternateContent>
-        <mc:AlternateContent xmlns:mc="http://schemas.openxmlformats.org/markup-compatibility/2006">
-          <mc:Choice xmlns:p14="http://schemas.microsoft.com/office/powerpoint/2010/main" Requires="p14">
+        <mc:AlternateContent xmlns:mc="http://schemas.openxmlformats.org/markup-compatibility/2006" xmlns:p14="http://schemas.microsoft.com/office/powerpoint/2010/main">
+          <mc:Choice Requires="p14">
             <p:contentPart p14:bwMode="auto" r:id="rId49">
               <p14:nvContentPartPr>
                 <p14:cNvPr id="139" name="Tinta 138">
@@ -7736,7 +7800,7 @@
               </p14:xfrm>
             </p:contentPart>
           </mc:Choice>
-          <mc:Fallback>
+          <mc:Fallback xmlns="">
             <p:pic>
               <p:nvPicPr>
                 <p:cNvPr id="139" name="Tinta 138">
@@ -7767,8 +7831,8 @@
             </p:pic>
           </mc:Fallback>
         </mc:AlternateContent>
-        <mc:AlternateContent xmlns:mc="http://schemas.openxmlformats.org/markup-compatibility/2006">
-          <mc:Choice xmlns:p14="http://schemas.microsoft.com/office/powerpoint/2010/main" Requires="p14">
+        <mc:AlternateContent xmlns:mc="http://schemas.openxmlformats.org/markup-compatibility/2006" xmlns:p14="http://schemas.microsoft.com/office/powerpoint/2010/main">
+          <mc:Choice Requires="p14">
             <p:contentPart p14:bwMode="auto" r:id="rId51">
               <p14:nvContentPartPr>
                 <p14:cNvPr id="140" name="Tinta 139">
@@ -7787,7 +7851,7 @@
               </p14:xfrm>
             </p:contentPart>
           </mc:Choice>
-          <mc:Fallback>
+          <mc:Fallback xmlns="">
             <p:pic>
               <p:nvPicPr>
                 <p:cNvPr id="140" name="Tinta 139">
@@ -7818,8 +7882,8 @@
             </p:pic>
           </mc:Fallback>
         </mc:AlternateContent>
-        <mc:AlternateContent xmlns:mc="http://schemas.openxmlformats.org/markup-compatibility/2006">
-          <mc:Choice xmlns:p14="http://schemas.microsoft.com/office/powerpoint/2010/main" Requires="p14">
+        <mc:AlternateContent xmlns:mc="http://schemas.openxmlformats.org/markup-compatibility/2006" xmlns:p14="http://schemas.microsoft.com/office/powerpoint/2010/main">
+          <mc:Choice Requires="p14">
             <p:contentPart p14:bwMode="auto" r:id="rId53">
               <p14:nvContentPartPr>
                 <p14:cNvPr id="141" name="Tinta 140">
@@ -7838,7 +7902,7 @@
               </p14:xfrm>
             </p:contentPart>
           </mc:Choice>
-          <mc:Fallback>
+          <mc:Fallback xmlns="">
             <p:pic>
               <p:nvPicPr>
                 <p:cNvPr id="141" name="Tinta 140">
@@ -7930,8 +7994,8 @@
           </a:prstGeom>
         </p:spPr>
       </p:pic>
-      <mc:AlternateContent xmlns:mc="http://schemas.openxmlformats.org/markup-compatibility/2006">
-        <mc:Choice xmlns:p14="http://schemas.microsoft.com/office/powerpoint/2010/main" Requires="p14">
+      <mc:AlternateContent xmlns:mc="http://schemas.openxmlformats.org/markup-compatibility/2006" xmlns:p14="http://schemas.microsoft.com/office/powerpoint/2010/main">
+        <mc:Choice Requires="p14">
           <p:contentPart p14:bwMode="auto" r:id="rId3">
             <p14:nvContentPartPr>
               <p14:cNvPr id="20" name="Tinta 19">
@@ -7950,7 +8014,7 @@
             </p14:xfrm>
           </p:contentPart>
         </mc:Choice>
-        <mc:Fallback>
+        <mc:Fallback xmlns="">
           <p:pic>
             <p:nvPicPr>
               <p:cNvPr id="20" name="Tinta 19">
@@ -8001,8 +8065,8 @@
             <a:chExt cx="2201400" cy="1404000"/>
           </a:xfrm>
         </p:grpSpPr>
-        <mc:AlternateContent xmlns:mc="http://schemas.openxmlformats.org/markup-compatibility/2006">
-          <mc:Choice xmlns:p14="http://schemas.microsoft.com/office/powerpoint/2010/main" Requires="p14">
+        <mc:AlternateContent xmlns:mc="http://schemas.openxmlformats.org/markup-compatibility/2006" xmlns:p14="http://schemas.microsoft.com/office/powerpoint/2010/main">
+          <mc:Choice Requires="p14">
             <p:contentPart p14:bwMode="auto" r:id="rId5">
               <p14:nvContentPartPr>
                 <p14:cNvPr id="21" name="Tinta 20">
@@ -8021,7 +8085,7 @@
               </p14:xfrm>
             </p:contentPart>
           </mc:Choice>
-          <mc:Fallback>
+          <mc:Fallback xmlns="">
             <p:pic>
               <p:nvPicPr>
                 <p:cNvPr id="21" name="Tinta 20">
@@ -8052,8 +8116,8 @@
             </p:pic>
           </mc:Fallback>
         </mc:AlternateContent>
-        <mc:AlternateContent xmlns:mc="http://schemas.openxmlformats.org/markup-compatibility/2006">
-          <mc:Choice xmlns:p14="http://schemas.microsoft.com/office/powerpoint/2010/main" Requires="p14">
+        <mc:AlternateContent xmlns:mc="http://schemas.openxmlformats.org/markup-compatibility/2006" xmlns:p14="http://schemas.microsoft.com/office/powerpoint/2010/main">
+          <mc:Choice Requires="p14">
             <p:contentPart p14:bwMode="auto" r:id="rId7">
               <p14:nvContentPartPr>
                 <p14:cNvPr id="22" name="Tinta 21">
@@ -8072,7 +8136,7 @@
               </p14:xfrm>
             </p:contentPart>
           </mc:Choice>
-          <mc:Fallback>
+          <mc:Fallback xmlns="">
             <p:pic>
               <p:nvPicPr>
                 <p:cNvPr id="22" name="Tinta 21">
@@ -8103,8 +8167,8 @@
             </p:pic>
           </mc:Fallback>
         </mc:AlternateContent>
-        <mc:AlternateContent xmlns:mc="http://schemas.openxmlformats.org/markup-compatibility/2006">
-          <mc:Choice xmlns:p14="http://schemas.microsoft.com/office/powerpoint/2010/main" Requires="p14">
+        <mc:AlternateContent xmlns:mc="http://schemas.openxmlformats.org/markup-compatibility/2006" xmlns:p14="http://schemas.microsoft.com/office/powerpoint/2010/main">
+          <mc:Choice Requires="p14">
             <p:contentPart p14:bwMode="auto" r:id="rId9">
               <p14:nvContentPartPr>
                 <p14:cNvPr id="23" name="Tinta 22">
@@ -8123,7 +8187,7 @@
               </p14:xfrm>
             </p:contentPart>
           </mc:Choice>
-          <mc:Fallback>
+          <mc:Fallback xmlns="">
             <p:pic>
               <p:nvPicPr>
                 <p:cNvPr id="23" name="Tinta 22">
@@ -8154,8 +8218,8 @@
             </p:pic>
           </mc:Fallback>
         </mc:AlternateContent>
-        <mc:AlternateContent xmlns:mc="http://schemas.openxmlformats.org/markup-compatibility/2006">
-          <mc:Choice xmlns:p14="http://schemas.microsoft.com/office/powerpoint/2010/main" Requires="p14">
+        <mc:AlternateContent xmlns:mc="http://schemas.openxmlformats.org/markup-compatibility/2006" xmlns:p14="http://schemas.microsoft.com/office/powerpoint/2010/main">
+          <mc:Choice Requires="p14">
             <p:contentPart p14:bwMode="auto" r:id="rId11">
               <p14:nvContentPartPr>
                 <p14:cNvPr id="25" name="Tinta 24">
@@ -8174,7 +8238,7 @@
               </p14:xfrm>
             </p:contentPart>
           </mc:Choice>
-          <mc:Fallback>
+          <mc:Fallback xmlns="">
             <p:pic>
               <p:nvPicPr>
                 <p:cNvPr id="25" name="Tinta 24">
@@ -8205,8 +8269,8 @@
             </p:pic>
           </mc:Fallback>
         </mc:AlternateContent>
-        <mc:AlternateContent xmlns:mc="http://schemas.openxmlformats.org/markup-compatibility/2006">
-          <mc:Choice xmlns:p14="http://schemas.microsoft.com/office/powerpoint/2010/main" Requires="p14">
+        <mc:AlternateContent xmlns:mc="http://schemas.openxmlformats.org/markup-compatibility/2006" xmlns:p14="http://schemas.microsoft.com/office/powerpoint/2010/main">
+          <mc:Choice Requires="p14">
             <p:contentPart p14:bwMode="auto" r:id="rId13">
               <p14:nvContentPartPr>
                 <p14:cNvPr id="26" name="Tinta 25">
@@ -8225,7 +8289,7 @@
               </p14:xfrm>
             </p:contentPart>
           </mc:Choice>
-          <mc:Fallback>
+          <mc:Fallback xmlns="">
             <p:pic>
               <p:nvPicPr>
                 <p:cNvPr id="26" name="Tinta 25">
@@ -8256,8 +8320,8 @@
             </p:pic>
           </mc:Fallback>
         </mc:AlternateContent>
-        <mc:AlternateContent xmlns:mc="http://schemas.openxmlformats.org/markup-compatibility/2006">
-          <mc:Choice xmlns:p14="http://schemas.microsoft.com/office/powerpoint/2010/main" Requires="p14">
+        <mc:AlternateContent xmlns:mc="http://schemas.openxmlformats.org/markup-compatibility/2006" xmlns:p14="http://schemas.microsoft.com/office/powerpoint/2010/main">
+          <mc:Choice Requires="p14">
             <p:contentPart p14:bwMode="auto" r:id="rId15">
               <p14:nvContentPartPr>
                 <p14:cNvPr id="27" name="Tinta 26">
@@ -8276,7 +8340,7 @@
               </p14:xfrm>
             </p:contentPart>
           </mc:Choice>
-          <mc:Fallback>
+          <mc:Fallback xmlns="">
             <p:pic>
               <p:nvPicPr>
                 <p:cNvPr id="27" name="Tinta 26">
@@ -8307,8 +8371,8 @@
             </p:pic>
           </mc:Fallback>
         </mc:AlternateContent>
-        <mc:AlternateContent xmlns:mc="http://schemas.openxmlformats.org/markup-compatibility/2006">
-          <mc:Choice xmlns:p14="http://schemas.microsoft.com/office/powerpoint/2010/main" Requires="p14">
+        <mc:AlternateContent xmlns:mc="http://schemas.openxmlformats.org/markup-compatibility/2006" xmlns:p14="http://schemas.microsoft.com/office/powerpoint/2010/main">
+          <mc:Choice Requires="p14">
             <p:contentPart p14:bwMode="auto" r:id="rId17">
               <p14:nvContentPartPr>
                 <p14:cNvPr id="28" name="Tinta 27">
@@ -8327,7 +8391,7 @@
               </p14:xfrm>
             </p:contentPart>
           </mc:Choice>
-          <mc:Fallback>
+          <mc:Fallback xmlns="">
             <p:pic>
               <p:nvPicPr>
                 <p:cNvPr id="28" name="Tinta 27">
@@ -8358,8 +8422,8 @@
             </p:pic>
           </mc:Fallback>
         </mc:AlternateContent>
-        <mc:AlternateContent xmlns:mc="http://schemas.openxmlformats.org/markup-compatibility/2006">
-          <mc:Choice xmlns:p14="http://schemas.microsoft.com/office/powerpoint/2010/main" Requires="p14">
+        <mc:AlternateContent xmlns:mc="http://schemas.openxmlformats.org/markup-compatibility/2006" xmlns:p14="http://schemas.microsoft.com/office/powerpoint/2010/main">
+          <mc:Choice Requires="p14">
             <p:contentPart p14:bwMode="auto" r:id="rId19">
               <p14:nvContentPartPr>
                 <p14:cNvPr id="29" name="Tinta 28">
@@ -8378,7 +8442,7 @@
               </p14:xfrm>
             </p:contentPart>
           </mc:Choice>
-          <mc:Fallback>
+          <mc:Fallback xmlns="">
             <p:pic>
               <p:nvPicPr>
                 <p:cNvPr id="29" name="Tinta 28">
@@ -8409,8 +8473,8 @@
             </p:pic>
           </mc:Fallback>
         </mc:AlternateContent>
-        <mc:AlternateContent xmlns:mc="http://schemas.openxmlformats.org/markup-compatibility/2006">
-          <mc:Choice xmlns:p14="http://schemas.microsoft.com/office/powerpoint/2010/main" Requires="p14">
+        <mc:AlternateContent xmlns:mc="http://schemas.openxmlformats.org/markup-compatibility/2006" xmlns:p14="http://schemas.microsoft.com/office/powerpoint/2010/main">
+          <mc:Choice Requires="p14">
             <p:contentPart p14:bwMode="auto" r:id="rId21">
               <p14:nvContentPartPr>
                 <p14:cNvPr id="30" name="Tinta 29">
@@ -8429,7 +8493,7 @@
               </p14:xfrm>
             </p:contentPart>
           </mc:Choice>
-          <mc:Fallback>
+          <mc:Fallback xmlns="">
             <p:pic>
               <p:nvPicPr>
                 <p:cNvPr id="30" name="Tinta 29">
@@ -8460,8 +8524,8 @@
             </p:pic>
           </mc:Fallback>
         </mc:AlternateContent>
-        <mc:AlternateContent xmlns:mc="http://schemas.openxmlformats.org/markup-compatibility/2006">
-          <mc:Choice xmlns:p14="http://schemas.microsoft.com/office/powerpoint/2010/main" Requires="p14">
+        <mc:AlternateContent xmlns:mc="http://schemas.openxmlformats.org/markup-compatibility/2006" xmlns:p14="http://schemas.microsoft.com/office/powerpoint/2010/main">
+          <mc:Choice Requires="p14">
             <p:contentPart p14:bwMode="auto" r:id="rId23">
               <p14:nvContentPartPr>
                 <p14:cNvPr id="31" name="Tinta 30">
@@ -8480,7 +8544,7 @@
               </p14:xfrm>
             </p:contentPart>
           </mc:Choice>
-          <mc:Fallback>
+          <mc:Fallback xmlns="">
             <p:pic>
               <p:nvPicPr>
                 <p:cNvPr id="31" name="Tinta 30">
@@ -8511,8 +8575,8 @@
             </p:pic>
           </mc:Fallback>
         </mc:AlternateContent>
-        <mc:AlternateContent xmlns:mc="http://schemas.openxmlformats.org/markup-compatibility/2006">
-          <mc:Choice xmlns:p14="http://schemas.microsoft.com/office/powerpoint/2010/main" Requires="p14">
+        <mc:AlternateContent xmlns:mc="http://schemas.openxmlformats.org/markup-compatibility/2006" xmlns:p14="http://schemas.microsoft.com/office/powerpoint/2010/main">
+          <mc:Choice Requires="p14">
             <p:contentPart p14:bwMode="auto" r:id="rId25">
               <p14:nvContentPartPr>
                 <p14:cNvPr id="32" name="Tinta 31">
@@ -8531,7 +8595,7 @@
               </p14:xfrm>
             </p:contentPart>
           </mc:Choice>
-          <mc:Fallback>
+          <mc:Fallback xmlns="">
             <p:pic>
               <p:nvPicPr>
                 <p:cNvPr id="32" name="Tinta 31">
@@ -8562,8 +8626,8 @@
             </p:pic>
           </mc:Fallback>
         </mc:AlternateContent>
-        <mc:AlternateContent xmlns:mc="http://schemas.openxmlformats.org/markup-compatibility/2006">
-          <mc:Choice xmlns:p14="http://schemas.microsoft.com/office/powerpoint/2010/main" Requires="p14">
+        <mc:AlternateContent xmlns:mc="http://schemas.openxmlformats.org/markup-compatibility/2006" xmlns:p14="http://schemas.microsoft.com/office/powerpoint/2010/main">
+          <mc:Choice Requires="p14">
             <p:contentPart p14:bwMode="auto" r:id="rId27">
               <p14:nvContentPartPr>
                 <p14:cNvPr id="33" name="Tinta 32">
@@ -8582,7 +8646,7 @@
               </p14:xfrm>
             </p:contentPart>
           </mc:Choice>
-          <mc:Fallback>
+          <mc:Fallback xmlns="">
             <p:pic>
               <p:nvPicPr>
                 <p:cNvPr id="33" name="Tinta 32">
@@ -8613,8 +8677,8 @@
             </p:pic>
           </mc:Fallback>
         </mc:AlternateContent>
-        <mc:AlternateContent xmlns:mc="http://schemas.openxmlformats.org/markup-compatibility/2006">
-          <mc:Choice xmlns:p14="http://schemas.microsoft.com/office/powerpoint/2010/main" Requires="p14">
+        <mc:AlternateContent xmlns:mc="http://schemas.openxmlformats.org/markup-compatibility/2006" xmlns:p14="http://schemas.microsoft.com/office/powerpoint/2010/main">
+          <mc:Choice Requires="p14">
             <p:contentPart p14:bwMode="auto" r:id="rId29">
               <p14:nvContentPartPr>
                 <p14:cNvPr id="34" name="Tinta 33">
@@ -8633,7 +8697,7 @@
               </p14:xfrm>
             </p:contentPart>
           </mc:Choice>
-          <mc:Fallback>
+          <mc:Fallback xmlns="">
             <p:pic>
               <p:nvPicPr>
                 <p:cNvPr id="34" name="Tinta 33">
@@ -8664,8 +8728,8 @@
             </p:pic>
           </mc:Fallback>
         </mc:AlternateContent>
-        <mc:AlternateContent xmlns:mc="http://schemas.openxmlformats.org/markup-compatibility/2006">
-          <mc:Choice xmlns:p14="http://schemas.microsoft.com/office/powerpoint/2010/main" Requires="p14">
+        <mc:AlternateContent xmlns:mc="http://schemas.openxmlformats.org/markup-compatibility/2006" xmlns:p14="http://schemas.microsoft.com/office/powerpoint/2010/main">
+          <mc:Choice Requires="p14">
             <p:contentPart p14:bwMode="auto" r:id="rId31">
               <p14:nvContentPartPr>
                 <p14:cNvPr id="37" name="Tinta 36">
@@ -8684,7 +8748,7 @@
               </p14:xfrm>
             </p:contentPart>
           </mc:Choice>
-          <mc:Fallback>
+          <mc:Fallback xmlns="">
             <p:pic>
               <p:nvPicPr>
                 <p:cNvPr id="37" name="Tinta 36">
@@ -8715,8 +8779,8 @@
             </p:pic>
           </mc:Fallback>
         </mc:AlternateContent>
-        <mc:AlternateContent xmlns:mc="http://schemas.openxmlformats.org/markup-compatibility/2006">
-          <mc:Choice xmlns:p14="http://schemas.microsoft.com/office/powerpoint/2010/main" Requires="p14">
+        <mc:AlternateContent xmlns:mc="http://schemas.openxmlformats.org/markup-compatibility/2006" xmlns:p14="http://schemas.microsoft.com/office/powerpoint/2010/main">
+          <mc:Choice Requires="p14">
             <p:contentPart p14:bwMode="auto" r:id="rId33">
               <p14:nvContentPartPr>
                 <p14:cNvPr id="38" name="Tinta 37">
@@ -8735,7 +8799,7 @@
               </p14:xfrm>
             </p:contentPart>
           </mc:Choice>
-          <mc:Fallback>
+          <mc:Fallback xmlns="">
             <p:pic>
               <p:nvPicPr>
                 <p:cNvPr id="38" name="Tinta 37">
@@ -8766,8 +8830,8 @@
             </p:pic>
           </mc:Fallback>
         </mc:AlternateContent>
-        <mc:AlternateContent xmlns:mc="http://schemas.openxmlformats.org/markup-compatibility/2006">
-          <mc:Choice xmlns:p14="http://schemas.microsoft.com/office/powerpoint/2010/main" Requires="p14">
+        <mc:AlternateContent xmlns:mc="http://schemas.openxmlformats.org/markup-compatibility/2006" xmlns:p14="http://schemas.microsoft.com/office/powerpoint/2010/main">
+          <mc:Choice Requires="p14">
             <p:contentPart p14:bwMode="auto" r:id="rId35">
               <p14:nvContentPartPr>
                 <p14:cNvPr id="39" name="Tinta 38">
@@ -8786,7 +8850,7 @@
               </p14:xfrm>
             </p:contentPart>
           </mc:Choice>
-          <mc:Fallback>
+          <mc:Fallback xmlns="">
             <p:pic>
               <p:nvPicPr>
                 <p:cNvPr id="39" name="Tinta 38">
@@ -8817,8 +8881,8 @@
             </p:pic>
           </mc:Fallback>
         </mc:AlternateContent>
-        <mc:AlternateContent xmlns:mc="http://schemas.openxmlformats.org/markup-compatibility/2006">
-          <mc:Choice xmlns:p14="http://schemas.microsoft.com/office/powerpoint/2010/main" Requires="p14">
+        <mc:AlternateContent xmlns:mc="http://schemas.openxmlformats.org/markup-compatibility/2006" xmlns:p14="http://schemas.microsoft.com/office/powerpoint/2010/main">
+          <mc:Choice Requires="p14">
             <p:contentPart p14:bwMode="auto" r:id="rId37">
               <p14:nvContentPartPr>
                 <p14:cNvPr id="40" name="Tinta 39">
@@ -8837,7 +8901,7 @@
               </p14:xfrm>
             </p:contentPart>
           </mc:Choice>
-          <mc:Fallback>
+          <mc:Fallback xmlns="">
             <p:pic>
               <p:nvPicPr>
                 <p:cNvPr id="40" name="Tinta 39">
@@ -8868,8 +8932,8 @@
             </p:pic>
           </mc:Fallback>
         </mc:AlternateContent>
-        <mc:AlternateContent xmlns:mc="http://schemas.openxmlformats.org/markup-compatibility/2006">
-          <mc:Choice xmlns:p14="http://schemas.microsoft.com/office/powerpoint/2010/main" Requires="p14">
+        <mc:AlternateContent xmlns:mc="http://schemas.openxmlformats.org/markup-compatibility/2006" xmlns:p14="http://schemas.microsoft.com/office/powerpoint/2010/main">
+          <mc:Choice Requires="p14">
             <p:contentPart p14:bwMode="auto" r:id="rId39">
               <p14:nvContentPartPr>
                 <p14:cNvPr id="41" name="Tinta 40">
@@ -8888,7 +8952,7 @@
               </p14:xfrm>
             </p:contentPart>
           </mc:Choice>
-          <mc:Fallback>
+          <mc:Fallback xmlns="">
             <p:pic>
               <p:nvPicPr>
                 <p:cNvPr id="41" name="Tinta 40">
@@ -8919,8 +8983,8 @@
             </p:pic>
           </mc:Fallback>
         </mc:AlternateContent>
-        <mc:AlternateContent xmlns:mc="http://schemas.openxmlformats.org/markup-compatibility/2006">
-          <mc:Choice xmlns:p14="http://schemas.microsoft.com/office/powerpoint/2010/main" Requires="p14">
+        <mc:AlternateContent xmlns:mc="http://schemas.openxmlformats.org/markup-compatibility/2006" xmlns:p14="http://schemas.microsoft.com/office/powerpoint/2010/main">
+          <mc:Choice Requires="p14">
             <p:contentPart p14:bwMode="auto" r:id="rId41">
               <p14:nvContentPartPr>
                 <p14:cNvPr id="42" name="Tinta 41">
@@ -8939,7 +9003,7 @@
               </p14:xfrm>
             </p:contentPart>
           </mc:Choice>
-          <mc:Fallback>
+          <mc:Fallback xmlns="">
             <p:pic>
               <p:nvPicPr>
                 <p:cNvPr id="42" name="Tinta 41">
@@ -8970,8 +9034,8 @@
             </p:pic>
           </mc:Fallback>
         </mc:AlternateContent>
-        <mc:AlternateContent xmlns:mc="http://schemas.openxmlformats.org/markup-compatibility/2006">
-          <mc:Choice xmlns:p14="http://schemas.microsoft.com/office/powerpoint/2010/main" Requires="p14">
+        <mc:AlternateContent xmlns:mc="http://schemas.openxmlformats.org/markup-compatibility/2006" xmlns:p14="http://schemas.microsoft.com/office/powerpoint/2010/main">
+          <mc:Choice Requires="p14">
             <p:contentPart p14:bwMode="auto" r:id="rId43">
               <p14:nvContentPartPr>
                 <p14:cNvPr id="43" name="Tinta 42">
@@ -8990,7 +9054,7 @@
               </p14:xfrm>
             </p:contentPart>
           </mc:Choice>
-          <mc:Fallback>
+          <mc:Fallback xmlns="">
             <p:pic>
               <p:nvPicPr>
                 <p:cNvPr id="43" name="Tinta 42">
@@ -9021,8 +9085,8 @@
             </p:pic>
           </mc:Fallback>
         </mc:AlternateContent>
-        <mc:AlternateContent xmlns:mc="http://schemas.openxmlformats.org/markup-compatibility/2006">
-          <mc:Choice xmlns:p14="http://schemas.microsoft.com/office/powerpoint/2010/main" Requires="p14">
+        <mc:AlternateContent xmlns:mc="http://schemas.openxmlformats.org/markup-compatibility/2006" xmlns:p14="http://schemas.microsoft.com/office/powerpoint/2010/main">
+          <mc:Choice Requires="p14">
             <p:contentPart p14:bwMode="auto" r:id="rId45">
               <p14:nvContentPartPr>
                 <p14:cNvPr id="44" name="Tinta 43">
@@ -9041,7 +9105,7 @@
               </p14:xfrm>
             </p:contentPart>
           </mc:Choice>
-          <mc:Fallback>
+          <mc:Fallback xmlns="">
             <p:pic>
               <p:nvPicPr>
                 <p:cNvPr id="44" name="Tinta 43">
@@ -9093,8 +9157,8 @@
             <a:chExt cx="3691440" cy="463680"/>
           </a:xfrm>
         </p:grpSpPr>
-        <mc:AlternateContent xmlns:mc="http://schemas.openxmlformats.org/markup-compatibility/2006">
-          <mc:Choice xmlns:p14="http://schemas.microsoft.com/office/powerpoint/2010/main" Requires="p14">
+        <mc:AlternateContent xmlns:mc="http://schemas.openxmlformats.org/markup-compatibility/2006" xmlns:p14="http://schemas.microsoft.com/office/powerpoint/2010/main">
+          <mc:Choice Requires="p14">
             <p:contentPart p14:bwMode="auto" r:id="rId47">
               <p14:nvContentPartPr>
                 <p14:cNvPr id="131" name="Tinta 130">
@@ -9113,7 +9177,7 @@
               </p14:xfrm>
             </p:contentPart>
           </mc:Choice>
-          <mc:Fallback>
+          <mc:Fallback xmlns="">
             <p:pic>
               <p:nvPicPr>
                 <p:cNvPr id="131" name="Tinta 130">
@@ -9144,8 +9208,8 @@
             </p:pic>
           </mc:Fallback>
         </mc:AlternateContent>
-        <mc:AlternateContent xmlns:mc="http://schemas.openxmlformats.org/markup-compatibility/2006">
-          <mc:Choice xmlns:p14="http://schemas.microsoft.com/office/powerpoint/2010/main" Requires="p14">
+        <mc:AlternateContent xmlns:mc="http://schemas.openxmlformats.org/markup-compatibility/2006" xmlns:p14="http://schemas.microsoft.com/office/powerpoint/2010/main">
+          <mc:Choice Requires="p14">
             <p:contentPart p14:bwMode="auto" r:id="rId49">
               <p14:nvContentPartPr>
                 <p14:cNvPr id="132" name="Tinta 131">
@@ -9164,7 +9228,7 @@
               </p14:xfrm>
             </p:contentPart>
           </mc:Choice>
-          <mc:Fallback>
+          <mc:Fallback xmlns="">
             <p:pic>
               <p:nvPicPr>
                 <p:cNvPr id="132" name="Tinta 131">
@@ -9195,8 +9259,8 @@
             </p:pic>
           </mc:Fallback>
         </mc:AlternateContent>
-        <mc:AlternateContent xmlns:mc="http://schemas.openxmlformats.org/markup-compatibility/2006">
-          <mc:Choice xmlns:p14="http://schemas.microsoft.com/office/powerpoint/2010/main" Requires="p14">
+        <mc:AlternateContent xmlns:mc="http://schemas.openxmlformats.org/markup-compatibility/2006" xmlns:p14="http://schemas.microsoft.com/office/powerpoint/2010/main">
+          <mc:Choice Requires="p14">
             <p:contentPart p14:bwMode="auto" r:id="rId51">
               <p14:nvContentPartPr>
                 <p14:cNvPr id="133" name="Tinta 132">
@@ -9215,7 +9279,7 @@
               </p14:xfrm>
             </p:contentPart>
           </mc:Choice>
-          <mc:Fallback>
+          <mc:Fallback xmlns="">
             <p:pic>
               <p:nvPicPr>
                 <p:cNvPr id="133" name="Tinta 132">
@@ -9246,8 +9310,8 @@
             </p:pic>
           </mc:Fallback>
         </mc:AlternateContent>
-        <mc:AlternateContent xmlns:mc="http://schemas.openxmlformats.org/markup-compatibility/2006">
-          <mc:Choice xmlns:p14="http://schemas.microsoft.com/office/powerpoint/2010/main" Requires="p14">
+        <mc:AlternateContent xmlns:mc="http://schemas.openxmlformats.org/markup-compatibility/2006" xmlns:p14="http://schemas.microsoft.com/office/powerpoint/2010/main">
+          <mc:Choice Requires="p14">
             <p:contentPart p14:bwMode="auto" r:id="rId53">
               <p14:nvContentPartPr>
                 <p14:cNvPr id="134" name="Tinta 133">
@@ -9266,7 +9330,7 @@
               </p14:xfrm>
             </p:contentPart>
           </mc:Choice>
-          <mc:Fallback>
+          <mc:Fallback xmlns="">
             <p:pic>
               <p:nvPicPr>
                 <p:cNvPr id="134" name="Tinta 133">
@@ -9297,8 +9361,8 @@
             </p:pic>
           </mc:Fallback>
         </mc:AlternateContent>
-        <mc:AlternateContent xmlns:mc="http://schemas.openxmlformats.org/markup-compatibility/2006">
-          <mc:Choice xmlns:p14="http://schemas.microsoft.com/office/powerpoint/2010/main" Requires="p14">
+        <mc:AlternateContent xmlns:mc="http://schemas.openxmlformats.org/markup-compatibility/2006" xmlns:p14="http://schemas.microsoft.com/office/powerpoint/2010/main">
+          <mc:Choice Requires="p14">
             <p:contentPart p14:bwMode="auto" r:id="rId55">
               <p14:nvContentPartPr>
                 <p14:cNvPr id="135" name="Tinta 134">
@@ -9317,7 +9381,7 @@
               </p14:xfrm>
             </p:contentPart>
           </mc:Choice>
-          <mc:Fallback>
+          <mc:Fallback xmlns="">
             <p:pic>
               <p:nvPicPr>
                 <p:cNvPr id="135" name="Tinta 134">
@@ -9348,8 +9412,8 @@
             </p:pic>
           </mc:Fallback>
         </mc:AlternateContent>
-        <mc:AlternateContent xmlns:mc="http://schemas.openxmlformats.org/markup-compatibility/2006">
-          <mc:Choice xmlns:p14="http://schemas.microsoft.com/office/powerpoint/2010/main" Requires="p14">
+        <mc:AlternateContent xmlns:mc="http://schemas.openxmlformats.org/markup-compatibility/2006" xmlns:p14="http://schemas.microsoft.com/office/powerpoint/2010/main">
+          <mc:Choice Requires="p14">
             <p:contentPart p14:bwMode="auto" r:id="rId57">
               <p14:nvContentPartPr>
                 <p14:cNvPr id="136" name="Tinta 135">
@@ -9368,7 +9432,7 @@
               </p14:xfrm>
             </p:contentPart>
           </mc:Choice>
-          <mc:Fallback>
+          <mc:Fallback xmlns="">
             <p:pic>
               <p:nvPicPr>
                 <p:cNvPr id="136" name="Tinta 135">
@@ -9399,8 +9463,8 @@
             </p:pic>
           </mc:Fallback>
         </mc:AlternateContent>
-        <mc:AlternateContent xmlns:mc="http://schemas.openxmlformats.org/markup-compatibility/2006">
-          <mc:Choice xmlns:p14="http://schemas.microsoft.com/office/powerpoint/2010/main" Requires="p14">
+        <mc:AlternateContent xmlns:mc="http://schemas.openxmlformats.org/markup-compatibility/2006" xmlns:p14="http://schemas.microsoft.com/office/powerpoint/2010/main">
+          <mc:Choice Requires="p14">
             <p:contentPart p14:bwMode="auto" r:id="rId59">
               <p14:nvContentPartPr>
                 <p14:cNvPr id="137" name="Tinta 136">
@@ -9419,7 +9483,7 @@
               </p14:xfrm>
             </p:contentPart>
           </mc:Choice>
-          <mc:Fallback>
+          <mc:Fallback xmlns="">
             <p:pic>
               <p:nvPicPr>
                 <p:cNvPr id="137" name="Tinta 136">
@@ -9450,8 +9514,8 @@
             </p:pic>
           </mc:Fallback>
         </mc:AlternateContent>
-        <mc:AlternateContent xmlns:mc="http://schemas.openxmlformats.org/markup-compatibility/2006">
-          <mc:Choice xmlns:p14="http://schemas.microsoft.com/office/powerpoint/2010/main" Requires="p14">
+        <mc:AlternateContent xmlns:mc="http://schemas.openxmlformats.org/markup-compatibility/2006" xmlns:p14="http://schemas.microsoft.com/office/powerpoint/2010/main">
+          <mc:Choice Requires="p14">
             <p:contentPart p14:bwMode="auto" r:id="rId61">
               <p14:nvContentPartPr>
                 <p14:cNvPr id="138" name="Tinta 137">
@@ -9470,7 +9534,7 @@
               </p14:xfrm>
             </p:contentPart>
           </mc:Choice>
-          <mc:Fallback>
+          <mc:Fallback xmlns="">
             <p:pic>
               <p:nvPicPr>
                 <p:cNvPr id="138" name="Tinta 137">
@@ -9501,8 +9565,8 @@
             </p:pic>
           </mc:Fallback>
         </mc:AlternateContent>
-        <mc:AlternateContent xmlns:mc="http://schemas.openxmlformats.org/markup-compatibility/2006">
-          <mc:Choice xmlns:p14="http://schemas.microsoft.com/office/powerpoint/2010/main" Requires="p14">
+        <mc:AlternateContent xmlns:mc="http://schemas.openxmlformats.org/markup-compatibility/2006" xmlns:p14="http://schemas.microsoft.com/office/powerpoint/2010/main">
+          <mc:Choice Requires="p14">
             <p:contentPart p14:bwMode="auto" r:id="rId63">
               <p14:nvContentPartPr>
                 <p14:cNvPr id="139" name="Tinta 138">
@@ -9521,7 +9585,7 @@
               </p14:xfrm>
             </p:contentPart>
           </mc:Choice>
-          <mc:Fallback>
+          <mc:Fallback xmlns="">
             <p:pic>
               <p:nvPicPr>
                 <p:cNvPr id="139" name="Tinta 138">
@@ -9552,8 +9616,8 @@
             </p:pic>
           </mc:Fallback>
         </mc:AlternateContent>
-        <mc:AlternateContent xmlns:mc="http://schemas.openxmlformats.org/markup-compatibility/2006">
-          <mc:Choice xmlns:p14="http://schemas.microsoft.com/office/powerpoint/2010/main" Requires="p14">
+        <mc:AlternateContent xmlns:mc="http://schemas.openxmlformats.org/markup-compatibility/2006" xmlns:p14="http://schemas.microsoft.com/office/powerpoint/2010/main">
+          <mc:Choice Requires="p14">
             <p:contentPart p14:bwMode="auto" r:id="rId65">
               <p14:nvContentPartPr>
                 <p14:cNvPr id="140" name="Tinta 139">
@@ -9572,7 +9636,7 @@
               </p14:xfrm>
             </p:contentPart>
           </mc:Choice>
-          <mc:Fallback>
+          <mc:Fallback xmlns="">
             <p:pic>
               <p:nvPicPr>
                 <p:cNvPr id="140" name="Tinta 139">
@@ -9603,8 +9667,8 @@
             </p:pic>
           </mc:Fallback>
         </mc:AlternateContent>
-        <mc:AlternateContent xmlns:mc="http://schemas.openxmlformats.org/markup-compatibility/2006">
-          <mc:Choice xmlns:p14="http://schemas.microsoft.com/office/powerpoint/2010/main" Requires="p14">
+        <mc:AlternateContent xmlns:mc="http://schemas.openxmlformats.org/markup-compatibility/2006" xmlns:p14="http://schemas.microsoft.com/office/powerpoint/2010/main">
+          <mc:Choice Requires="p14">
             <p:contentPart p14:bwMode="auto" r:id="rId67">
               <p14:nvContentPartPr>
                 <p14:cNvPr id="141" name="Tinta 140">
@@ -9623,7 +9687,7 @@
               </p14:xfrm>
             </p:contentPart>
           </mc:Choice>
-          <mc:Fallback>
+          <mc:Fallback xmlns="">
             <p:pic>
               <p:nvPicPr>
                 <p:cNvPr id="141" name="Tinta 140">
@@ -9654,8 +9718,8 @@
             </p:pic>
           </mc:Fallback>
         </mc:AlternateContent>
-        <mc:AlternateContent xmlns:mc="http://schemas.openxmlformats.org/markup-compatibility/2006">
-          <mc:Choice xmlns:p14="http://schemas.microsoft.com/office/powerpoint/2010/main" Requires="p14">
+        <mc:AlternateContent xmlns:mc="http://schemas.openxmlformats.org/markup-compatibility/2006" xmlns:p14="http://schemas.microsoft.com/office/powerpoint/2010/main">
+          <mc:Choice Requires="p14">
             <p:contentPart p14:bwMode="auto" r:id="rId69">
               <p14:nvContentPartPr>
                 <p14:cNvPr id="142" name="Tinta 141">
@@ -9674,7 +9738,7 @@
               </p14:xfrm>
             </p:contentPart>
           </mc:Choice>
-          <mc:Fallback>
+          <mc:Fallback xmlns="">
             <p:pic>
               <p:nvPicPr>
                 <p:cNvPr id="142" name="Tinta 141">
@@ -9705,8 +9769,8 @@
             </p:pic>
           </mc:Fallback>
         </mc:AlternateContent>
-        <mc:AlternateContent xmlns:mc="http://schemas.openxmlformats.org/markup-compatibility/2006">
-          <mc:Choice xmlns:p14="http://schemas.microsoft.com/office/powerpoint/2010/main" Requires="p14">
+        <mc:AlternateContent xmlns:mc="http://schemas.openxmlformats.org/markup-compatibility/2006" xmlns:p14="http://schemas.microsoft.com/office/powerpoint/2010/main">
+          <mc:Choice Requires="p14">
             <p:contentPart p14:bwMode="auto" r:id="rId71">
               <p14:nvContentPartPr>
                 <p14:cNvPr id="143" name="Tinta 142">
@@ -9725,7 +9789,7 @@
               </p14:xfrm>
             </p:contentPart>
           </mc:Choice>
-          <mc:Fallback>
+          <mc:Fallback xmlns="">
             <p:pic>
               <p:nvPicPr>
                 <p:cNvPr id="143" name="Tinta 142">
@@ -9756,8 +9820,8 @@
             </p:pic>
           </mc:Fallback>
         </mc:AlternateContent>
-        <mc:AlternateContent xmlns:mc="http://schemas.openxmlformats.org/markup-compatibility/2006">
-          <mc:Choice xmlns:p14="http://schemas.microsoft.com/office/powerpoint/2010/main" Requires="p14">
+        <mc:AlternateContent xmlns:mc="http://schemas.openxmlformats.org/markup-compatibility/2006" xmlns:p14="http://schemas.microsoft.com/office/powerpoint/2010/main">
+          <mc:Choice Requires="p14">
             <p:contentPart p14:bwMode="auto" r:id="rId73">
               <p14:nvContentPartPr>
                 <p14:cNvPr id="144" name="Tinta 143">
@@ -9776,7 +9840,7 @@
               </p14:xfrm>
             </p:contentPart>
           </mc:Choice>
-          <mc:Fallback>
+          <mc:Fallback xmlns="">
             <p:pic>
               <p:nvPicPr>
                 <p:cNvPr id="144" name="Tinta 143">
@@ -9807,8 +9871,8 @@
             </p:pic>
           </mc:Fallback>
         </mc:AlternateContent>
-        <mc:AlternateContent xmlns:mc="http://schemas.openxmlformats.org/markup-compatibility/2006">
-          <mc:Choice xmlns:p14="http://schemas.microsoft.com/office/powerpoint/2010/main" Requires="p14">
+        <mc:AlternateContent xmlns:mc="http://schemas.openxmlformats.org/markup-compatibility/2006" xmlns:p14="http://schemas.microsoft.com/office/powerpoint/2010/main">
+          <mc:Choice Requires="p14">
             <p:contentPart p14:bwMode="auto" r:id="rId75">
               <p14:nvContentPartPr>
                 <p14:cNvPr id="145" name="Tinta 144">
@@ -9827,7 +9891,7 @@
               </p14:xfrm>
             </p:contentPart>
           </mc:Choice>
-          <mc:Fallback>
+          <mc:Fallback xmlns="">
             <p:pic>
               <p:nvPicPr>
                 <p:cNvPr id="145" name="Tinta 144">
@@ -9858,8 +9922,8 @@
             </p:pic>
           </mc:Fallback>
         </mc:AlternateContent>
-        <mc:AlternateContent xmlns:mc="http://schemas.openxmlformats.org/markup-compatibility/2006">
-          <mc:Choice xmlns:p14="http://schemas.microsoft.com/office/powerpoint/2010/main" Requires="p14">
+        <mc:AlternateContent xmlns:mc="http://schemas.openxmlformats.org/markup-compatibility/2006" xmlns:p14="http://schemas.microsoft.com/office/powerpoint/2010/main">
+          <mc:Choice Requires="p14">
             <p:contentPart p14:bwMode="auto" r:id="rId77">
               <p14:nvContentPartPr>
                 <p14:cNvPr id="146" name="Tinta 145">
@@ -9878,7 +9942,7 @@
               </p14:xfrm>
             </p:contentPart>
           </mc:Choice>
-          <mc:Fallback>
+          <mc:Fallback xmlns="">
             <p:pic>
               <p:nvPicPr>
                 <p:cNvPr id="146" name="Tinta 145">
@@ -9909,8 +9973,8 @@
             </p:pic>
           </mc:Fallback>
         </mc:AlternateContent>
-        <mc:AlternateContent xmlns:mc="http://schemas.openxmlformats.org/markup-compatibility/2006">
-          <mc:Choice xmlns:p14="http://schemas.microsoft.com/office/powerpoint/2010/main" Requires="p14">
+        <mc:AlternateContent xmlns:mc="http://schemas.openxmlformats.org/markup-compatibility/2006" xmlns:p14="http://schemas.microsoft.com/office/powerpoint/2010/main">
+          <mc:Choice Requires="p14">
             <p:contentPart p14:bwMode="auto" r:id="rId79">
               <p14:nvContentPartPr>
                 <p14:cNvPr id="147" name="Tinta 146">
@@ -9929,7 +9993,7 @@
               </p14:xfrm>
             </p:contentPart>
           </mc:Choice>
-          <mc:Fallback>
+          <mc:Fallback xmlns="">
             <p:pic>
               <p:nvPicPr>
                 <p:cNvPr id="147" name="Tinta 146">
@@ -9960,8 +10024,8 @@
             </p:pic>
           </mc:Fallback>
         </mc:AlternateContent>
-        <mc:AlternateContent xmlns:mc="http://schemas.openxmlformats.org/markup-compatibility/2006">
-          <mc:Choice xmlns:p14="http://schemas.microsoft.com/office/powerpoint/2010/main" Requires="p14">
+        <mc:AlternateContent xmlns:mc="http://schemas.openxmlformats.org/markup-compatibility/2006" xmlns:p14="http://schemas.microsoft.com/office/powerpoint/2010/main">
+          <mc:Choice Requires="p14">
             <p:contentPart p14:bwMode="auto" r:id="rId81">
               <p14:nvContentPartPr>
                 <p14:cNvPr id="148" name="Tinta 147">
@@ -9980,7 +10044,7 @@
               </p14:xfrm>
             </p:contentPart>
           </mc:Choice>
-          <mc:Fallback>
+          <mc:Fallback xmlns="">
             <p:pic>
               <p:nvPicPr>
                 <p:cNvPr id="148" name="Tinta 147">
@@ -10011,8 +10075,8 @@
             </p:pic>
           </mc:Fallback>
         </mc:AlternateContent>
-        <mc:AlternateContent xmlns:mc="http://schemas.openxmlformats.org/markup-compatibility/2006">
-          <mc:Choice xmlns:p14="http://schemas.microsoft.com/office/powerpoint/2010/main" Requires="p14">
+        <mc:AlternateContent xmlns:mc="http://schemas.openxmlformats.org/markup-compatibility/2006" xmlns:p14="http://schemas.microsoft.com/office/powerpoint/2010/main">
+          <mc:Choice Requires="p14">
             <p:contentPart p14:bwMode="auto" r:id="rId83">
               <p14:nvContentPartPr>
                 <p14:cNvPr id="149" name="Tinta 148">
@@ -10031,7 +10095,7 @@
               </p14:xfrm>
             </p:contentPart>
           </mc:Choice>
-          <mc:Fallback>
+          <mc:Fallback xmlns="">
             <p:pic>
               <p:nvPicPr>
                 <p:cNvPr id="149" name="Tinta 148">
@@ -10062,8 +10126,8 @@
             </p:pic>
           </mc:Fallback>
         </mc:AlternateContent>
-        <mc:AlternateContent xmlns:mc="http://schemas.openxmlformats.org/markup-compatibility/2006">
-          <mc:Choice xmlns:p14="http://schemas.microsoft.com/office/powerpoint/2010/main" Requires="p14">
+        <mc:AlternateContent xmlns:mc="http://schemas.openxmlformats.org/markup-compatibility/2006" xmlns:p14="http://schemas.microsoft.com/office/powerpoint/2010/main">
+          <mc:Choice Requires="p14">
             <p:contentPart p14:bwMode="auto" r:id="rId85">
               <p14:nvContentPartPr>
                 <p14:cNvPr id="150" name="Tinta 149">
@@ -10082,7 +10146,7 @@
               </p14:xfrm>
             </p:contentPart>
           </mc:Choice>
-          <mc:Fallback>
+          <mc:Fallback xmlns="">
             <p:pic>
               <p:nvPicPr>
                 <p:cNvPr id="150" name="Tinta 149">
@@ -10113,8 +10177,8 @@
             </p:pic>
           </mc:Fallback>
         </mc:AlternateContent>
-        <mc:AlternateContent xmlns:mc="http://schemas.openxmlformats.org/markup-compatibility/2006">
-          <mc:Choice xmlns:p14="http://schemas.microsoft.com/office/powerpoint/2010/main" Requires="p14">
+        <mc:AlternateContent xmlns:mc="http://schemas.openxmlformats.org/markup-compatibility/2006" xmlns:p14="http://schemas.microsoft.com/office/powerpoint/2010/main">
+          <mc:Choice Requires="p14">
             <p:contentPart p14:bwMode="auto" r:id="rId87">
               <p14:nvContentPartPr>
                 <p14:cNvPr id="151" name="Tinta 150">
@@ -10133,7 +10197,7 @@
               </p14:xfrm>
             </p:contentPart>
           </mc:Choice>
-          <mc:Fallback>
+          <mc:Fallback xmlns="">
             <p:pic>
               <p:nvPicPr>
                 <p:cNvPr id="151" name="Tinta 150">
@@ -10185,8 +10249,8 @@
             <a:chExt cx="412560" cy="271440"/>
           </a:xfrm>
         </p:grpSpPr>
-        <mc:AlternateContent xmlns:mc="http://schemas.openxmlformats.org/markup-compatibility/2006">
-          <mc:Choice xmlns:p14="http://schemas.microsoft.com/office/powerpoint/2010/main" Requires="p14">
+        <mc:AlternateContent xmlns:mc="http://schemas.openxmlformats.org/markup-compatibility/2006" xmlns:p14="http://schemas.microsoft.com/office/powerpoint/2010/main">
+          <mc:Choice Requires="p14">
             <p:contentPart p14:bwMode="auto" r:id="rId89">
               <p14:nvContentPartPr>
                 <p14:cNvPr id="152" name="Tinta 151">
@@ -10205,7 +10269,7 @@
               </p14:xfrm>
             </p:contentPart>
           </mc:Choice>
-          <mc:Fallback>
+          <mc:Fallback xmlns="">
             <p:pic>
               <p:nvPicPr>
                 <p:cNvPr id="152" name="Tinta 151">
@@ -10236,8 +10300,8 @@
             </p:pic>
           </mc:Fallback>
         </mc:AlternateContent>
-        <mc:AlternateContent xmlns:mc="http://schemas.openxmlformats.org/markup-compatibility/2006">
-          <mc:Choice xmlns:p14="http://schemas.microsoft.com/office/powerpoint/2010/main" Requires="p14">
+        <mc:AlternateContent xmlns:mc="http://schemas.openxmlformats.org/markup-compatibility/2006" xmlns:p14="http://schemas.microsoft.com/office/powerpoint/2010/main">
+          <mc:Choice Requires="p14">
             <p:contentPart p14:bwMode="auto" r:id="rId91">
               <p14:nvContentPartPr>
                 <p14:cNvPr id="153" name="Tinta 152">
@@ -10256,7 +10320,7 @@
               </p14:xfrm>
             </p:contentPart>
           </mc:Choice>
-          <mc:Fallback>
+          <mc:Fallback xmlns="">
             <p:pic>
               <p:nvPicPr>
                 <p:cNvPr id="153" name="Tinta 152">
@@ -10308,8 +10372,8 @@
             <a:chExt cx="2528640" cy="435960"/>
           </a:xfrm>
         </p:grpSpPr>
-        <mc:AlternateContent xmlns:mc="http://schemas.openxmlformats.org/markup-compatibility/2006">
-          <mc:Choice xmlns:p14="http://schemas.microsoft.com/office/powerpoint/2010/main" Requires="p14">
+        <mc:AlternateContent xmlns:mc="http://schemas.openxmlformats.org/markup-compatibility/2006" xmlns:p14="http://schemas.microsoft.com/office/powerpoint/2010/main">
+          <mc:Choice Requires="p14">
             <p:contentPart p14:bwMode="auto" r:id="rId93">
               <p14:nvContentPartPr>
                 <p14:cNvPr id="156" name="Tinta 155">
@@ -10328,7 +10392,7 @@
               </p14:xfrm>
             </p:contentPart>
           </mc:Choice>
-          <mc:Fallback>
+          <mc:Fallback xmlns="">
             <p:pic>
               <p:nvPicPr>
                 <p:cNvPr id="156" name="Tinta 155">
@@ -10359,8 +10423,8 @@
             </p:pic>
           </mc:Fallback>
         </mc:AlternateContent>
-        <mc:AlternateContent xmlns:mc="http://schemas.openxmlformats.org/markup-compatibility/2006">
-          <mc:Choice xmlns:p14="http://schemas.microsoft.com/office/powerpoint/2010/main" Requires="p14">
+        <mc:AlternateContent xmlns:mc="http://schemas.openxmlformats.org/markup-compatibility/2006" xmlns:p14="http://schemas.microsoft.com/office/powerpoint/2010/main">
+          <mc:Choice Requires="p14">
             <p:contentPart p14:bwMode="auto" r:id="rId95">
               <p14:nvContentPartPr>
                 <p14:cNvPr id="157" name="Tinta 156">
@@ -10379,7 +10443,7 @@
               </p14:xfrm>
             </p:contentPart>
           </mc:Choice>
-          <mc:Fallback>
+          <mc:Fallback xmlns="">
             <p:pic>
               <p:nvPicPr>
                 <p:cNvPr id="157" name="Tinta 156">
@@ -10410,8 +10474,8 @@
             </p:pic>
           </mc:Fallback>
         </mc:AlternateContent>
-        <mc:AlternateContent xmlns:mc="http://schemas.openxmlformats.org/markup-compatibility/2006">
-          <mc:Choice xmlns:p14="http://schemas.microsoft.com/office/powerpoint/2010/main" Requires="p14">
+        <mc:AlternateContent xmlns:mc="http://schemas.openxmlformats.org/markup-compatibility/2006" xmlns:p14="http://schemas.microsoft.com/office/powerpoint/2010/main">
+          <mc:Choice Requires="p14">
             <p:contentPart p14:bwMode="auto" r:id="rId97">
               <p14:nvContentPartPr>
                 <p14:cNvPr id="158" name="Tinta 157">
@@ -10430,7 +10494,7 @@
               </p14:xfrm>
             </p:contentPart>
           </mc:Choice>
-          <mc:Fallback>
+          <mc:Fallback xmlns="">
             <p:pic>
               <p:nvPicPr>
                 <p:cNvPr id="158" name="Tinta 157">
@@ -10461,8 +10525,8 @@
             </p:pic>
           </mc:Fallback>
         </mc:AlternateContent>
-        <mc:AlternateContent xmlns:mc="http://schemas.openxmlformats.org/markup-compatibility/2006">
-          <mc:Choice xmlns:p14="http://schemas.microsoft.com/office/powerpoint/2010/main" Requires="p14">
+        <mc:AlternateContent xmlns:mc="http://schemas.openxmlformats.org/markup-compatibility/2006" xmlns:p14="http://schemas.microsoft.com/office/powerpoint/2010/main">
+          <mc:Choice Requires="p14">
             <p:contentPart p14:bwMode="auto" r:id="rId99">
               <p14:nvContentPartPr>
                 <p14:cNvPr id="159" name="Tinta 158">
@@ -10481,7 +10545,7 @@
               </p14:xfrm>
             </p:contentPart>
           </mc:Choice>
-          <mc:Fallback>
+          <mc:Fallback xmlns="">
             <p:pic>
               <p:nvPicPr>
                 <p:cNvPr id="159" name="Tinta 158">
@@ -10512,8 +10576,8 @@
             </p:pic>
           </mc:Fallback>
         </mc:AlternateContent>
-        <mc:AlternateContent xmlns:mc="http://schemas.openxmlformats.org/markup-compatibility/2006">
-          <mc:Choice xmlns:p14="http://schemas.microsoft.com/office/powerpoint/2010/main" Requires="p14">
+        <mc:AlternateContent xmlns:mc="http://schemas.openxmlformats.org/markup-compatibility/2006" xmlns:p14="http://schemas.microsoft.com/office/powerpoint/2010/main">
+          <mc:Choice Requires="p14">
             <p:contentPart p14:bwMode="auto" r:id="rId101">
               <p14:nvContentPartPr>
                 <p14:cNvPr id="160" name="Tinta 159">
@@ -10532,7 +10596,7 @@
               </p14:xfrm>
             </p:contentPart>
           </mc:Choice>
-          <mc:Fallback>
+          <mc:Fallback xmlns="">
             <p:pic>
               <p:nvPicPr>
                 <p:cNvPr id="160" name="Tinta 159">
@@ -10563,8 +10627,8 @@
             </p:pic>
           </mc:Fallback>
         </mc:AlternateContent>
-        <mc:AlternateContent xmlns:mc="http://schemas.openxmlformats.org/markup-compatibility/2006">
-          <mc:Choice xmlns:p14="http://schemas.microsoft.com/office/powerpoint/2010/main" Requires="p14">
+        <mc:AlternateContent xmlns:mc="http://schemas.openxmlformats.org/markup-compatibility/2006" xmlns:p14="http://schemas.microsoft.com/office/powerpoint/2010/main">
+          <mc:Choice Requires="p14">
             <p:contentPart p14:bwMode="auto" r:id="rId103">
               <p14:nvContentPartPr>
                 <p14:cNvPr id="161" name="Tinta 160">
@@ -10583,7 +10647,7 @@
               </p14:xfrm>
             </p:contentPart>
           </mc:Choice>
-          <mc:Fallback>
+          <mc:Fallback xmlns="">
             <p:pic>
               <p:nvPicPr>
                 <p:cNvPr id="161" name="Tinta 160">
@@ -10614,8 +10678,8 @@
             </p:pic>
           </mc:Fallback>
         </mc:AlternateContent>
-        <mc:AlternateContent xmlns:mc="http://schemas.openxmlformats.org/markup-compatibility/2006">
-          <mc:Choice xmlns:p14="http://schemas.microsoft.com/office/powerpoint/2010/main" Requires="p14">
+        <mc:AlternateContent xmlns:mc="http://schemas.openxmlformats.org/markup-compatibility/2006" xmlns:p14="http://schemas.microsoft.com/office/powerpoint/2010/main">
+          <mc:Choice Requires="p14">
             <p:contentPart p14:bwMode="auto" r:id="rId105">
               <p14:nvContentPartPr>
                 <p14:cNvPr id="162" name="Tinta 161">
@@ -10634,7 +10698,7 @@
               </p14:xfrm>
             </p:contentPart>
           </mc:Choice>
-          <mc:Fallback>
+          <mc:Fallback xmlns="">
             <p:pic>
               <p:nvPicPr>
                 <p:cNvPr id="162" name="Tinta 161">
@@ -10665,8 +10729,8 @@
             </p:pic>
           </mc:Fallback>
         </mc:AlternateContent>
-        <mc:AlternateContent xmlns:mc="http://schemas.openxmlformats.org/markup-compatibility/2006">
-          <mc:Choice xmlns:p14="http://schemas.microsoft.com/office/powerpoint/2010/main" Requires="p14">
+        <mc:AlternateContent xmlns:mc="http://schemas.openxmlformats.org/markup-compatibility/2006" xmlns:p14="http://schemas.microsoft.com/office/powerpoint/2010/main">
+          <mc:Choice Requires="p14">
             <p:contentPart p14:bwMode="auto" r:id="rId107">
               <p14:nvContentPartPr>
                 <p14:cNvPr id="163" name="Tinta 162">
@@ -10685,7 +10749,7 @@
               </p14:xfrm>
             </p:contentPart>
           </mc:Choice>
-          <mc:Fallback>
+          <mc:Fallback xmlns="">
             <p:pic>
               <p:nvPicPr>
                 <p:cNvPr id="163" name="Tinta 162">
@@ -10716,8 +10780,8 @@
             </p:pic>
           </mc:Fallback>
         </mc:AlternateContent>
-        <mc:AlternateContent xmlns:mc="http://schemas.openxmlformats.org/markup-compatibility/2006">
-          <mc:Choice xmlns:p14="http://schemas.microsoft.com/office/powerpoint/2010/main" Requires="p14">
+        <mc:AlternateContent xmlns:mc="http://schemas.openxmlformats.org/markup-compatibility/2006" xmlns:p14="http://schemas.microsoft.com/office/powerpoint/2010/main">
+          <mc:Choice Requires="p14">
             <p:contentPart p14:bwMode="auto" r:id="rId109">
               <p14:nvContentPartPr>
                 <p14:cNvPr id="164" name="Tinta 163">
@@ -10736,7 +10800,7 @@
               </p14:xfrm>
             </p:contentPart>
           </mc:Choice>
-          <mc:Fallback>
+          <mc:Fallback xmlns="">
             <p:pic>
               <p:nvPicPr>
                 <p:cNvPr id="164" name="Tinta 163">
@@ -10767,8 +10831,8 @@
             </p:pic>
           </mc:Fallback>
         </mc:AlternateContent>
-        <mc:AlternateContent xmlns:mc="http://schemas.openxmlformats.org/markup-compatibility/2006">
-          <mc:Choice xmlns:p14="http://schemas.microsoft.com/office/powerpoint/2010/main" Requires="p14">
+        <mc:AlternateContent xmlns:mc="http://schemas.openxmlformats.org/markup-compatibility/2006" xmlns:p14="http://schemas.microsoft.com/office/powerpoint/2010/main">
+          <mc:Choice Requires="p14">
             <p:contentPart p14:bwMode="auto" r:id="rId111">
               <p14:nvContentPartPr>
                 <p14:cNvPr id="165" name="Tinta 164">
@@ -10787,7 +10851,7 @@
               </p14:xfrm>
             </p:contentPart>
           </mc:Choice>
-          <mc:Fallback>
+          <mc:Fallback xmlns="">
             <p:pic>
               <p:nvPicPr>
                 <p:cNvPr id="165" name="Tinta 164">
@@ -10818,8 +10882,8 @@
             </p:pic>
           </mc:Fallback>
         </mc:AlternateContent>
-        <mc:AlternateContent xmlns:mc="http://schemas.openxmlformats.org/markup-compatibility/2006">
-          <mc:Choice xmlns:p14="http://schemas.microsoft.com/office/powerpoint/2010/main" Requires="p14">
+        <mc:AlternateContent xmlns:mc="http://schemas.openxmlformats.org/markup-compatibility/2006" xmlns:p14="http://schemas.microsoft.com/office/powerpoint/2010/main">
+          <mc:Choice Requires="p14">
             <p:contentPart p14:bwMode="auto" r:id="rId113">
               <p14:nvContentPartPr>
                 <p14:cNvPr id="166" name="Tinta 165">
@@ -10838,7 +10902,7 @@
               </p14:xfrm>
             </p:contentPart>
           </mc:Choice>
-          <mc:Fallback>
+          <mc:Fallback xmlns="">
             <p:pic>
               <p:nvPicPr>
                 <p:cNvPr id="166" name="Tinta 165">
@@ -10869,8 +10933,8 @@
             </p:pic>
           </mc:Fallback>
         </mc:AlternateContent>
-        <mc:AlternateContent xmlns:mc="http://schemas.openxmlformats.org/markup-compatibility/2006">
-          <mc:Choice xmlns:p14="http://schemas.microsoft.com/office/powerpoint/2010/main" Requires="p14">
+        <mc:AlternateContent xmlns:mc="http://schemas.openxmlformats.org/markup-compatibility/2006" xmlns:p14="http://schemas.microsoft.com/office/powerpoint/2010/main">
+          <mc:Choice Requires="p14">
             <p:contentPart p14:bwMode="auto" r:id="rId115">
               <p14:nvContentPartPr>
                 <p14:cNvPr id="167" name="Tinta 166">
@@ -10889,7 +10953,7 @@
               </p14:xfrm>
             </p:contentPart>
           </mc:Choice>
-          <mc:Fallback>
+          <mc:Fallback xmlns="">
             <p:pic>
               <p:nvPicPr>
                 <p:cNvPr id="167" name="Tinta 166">
@@ -10920,8 +10984,8 @@
             </p:pic>
           </mc:Fallback>
         </mc:AlternateContent>
-        <mc:AlternateContent xmlns:mc="http://schemas.openxmlformats.org/markup-compatibility/2006">
-          <mc:Choice xmlns:p14="http://schemas.microsoft.com/office/powerpoint/2010/main" Requires="p14">
+        <mc:AlternateContent xmlns:mc="http://schemas.openxmlformats.org/markup-compatibility/2006" xmlns:p14="http://schemas.microsoft.com/office/powerpoint/2010/main">
+          <mc:Choice Requires="p14">
             <p:contentPart p14:bwMode="auto" r:id="rId117">
               <p14:nvContentPartPr>
                 <p14:cNvPr id="168" name="Tinta 167">
@@ -10940,7 +11004,7 @@
               </p14:xfrm>
             </p:contentPart>
           </mc:Choice>
-          <mc:Fallback>
+          <mc:Fallback xmlns="">
             <p:pic>
               <p:nvPicPr>
                 <p:cNvPr id="168" name="Tinta 167">
@@ -10971,8 +11035,8 @@
             </p:pic>
           </mc:Fallback>
         </mc:AlternateContent>
-        <mc:AlternateContent xmlns:mc="http://schemas.openxmlformats.org/markup-compatibility/2006">
-          <mc:Choice xmlns:p14="http://schemas.microsoft.com/office/powerpoint/2010/main" Requires="p14">
+        <mc:AlternateContent xmlns:mc="http://schemas.openxmlformats.org/markup-compatibility/2006" xmlns:p14="http://schemas.microsoft.com/office/powerpoint/2010/main">
+          <mc:Choice Requires="p14">
             <p:contentPart p14:bwMode="auto" r:id="rId119">
               <p14:nvContentPartPr>
                 <p14:cNvPr id="169" name="Tinta 168">
@@ -10991,7 +11055,7 @@
               </p14:xfrm>
             </p:contentPart>
           </mc:Choice>
-          <mc:Fallback>
+          <mc:Fallback xmlns="">
             <p:pic>
               <p:nvPicPr>
                 <p:cNvPr id="169" name="Tinta 168">
@@ -11022,8 +11086,8 @@
             </p:pic>
           </mc:Fallback>
         </mc:AlternateContent>
-        <mc:AlternateContent xmlns:mc="http://schemas.openxmlformats.org/markup-compatibility/2006">
-          <mc:Choice xmlns:p14="http://schemas.microsoft.com/office/powerpoint/2010/main" Requires="p14">
+        <mc:AlternateContent xmlns:mc="http://schemas.openxmlformats.org/markup-compatibility/2006" xmlns:p14="http://schemas.microsoft.com/office/powerpoint/2010/main">
+          <mc:Choice Requires="p14">
             <p:contentPart p14:bwMode="auto" r:id="rId121">
               <p14:nvContentPartPr>
                 <p14:cNvPr id="170" name="Tinta 169">
@@ -11042,7 +11106,7 @@
               </p14:xfrm>
             </p:contentPart>
           </mc:Choice>
-          <mc:Fallback>
+          <mc:Fallback xmlns="">
             <p:pic>
               <p:nvPicPr>
                 <p:cNvPr id="170" name="Tinta 169">
@@ -11073,8 +11137,8 @@
             </p:pic>
           </mc:Fallback>
         </mc:AlternateContent>
-        <mc:AlternateContent xmlns:mc="http://schemas.openxmlformats.org/markup-compatibility/2006">
-          <mc:Choice xmlns:p14="http://schemas.microsoft.com/office/powerpoint/2010/main" Requires="p14">
+        <mc:AlternateContent xmlns:mc="http://schemas.openxmlformats.org/markup-compatibility/2006" xmlns:p14="http://schemas.microsoft.com/office/powerpoint/2010/main">
+          <mc:Choice Requires="p14">
             <p:contentPart p14:bwMode="auto" r:id="rId123">
               <p14:nvContentPartPr>
                 <p14:cNvPr id="171" name="Tinta 170">
@@ -11093,7 +11157,7 @@
               </p14:xfrm>
             </p:contentPart>
           </mc:Choice>
-          <mc:Fallback>
+          <mc:Fallback xmlns="">
             <p:pic>
               <p:nvPicPr>
                 <p:cNvPr id="171" name="Tinta 170">
@@ -11124,8 +11188,8 @@
             </p:pic>
           </mc:Fallback>
         </mc:AlternateContent>
-        <mc:AlternateContent xmlns:mc="http://schemas.openxmlformats.org/markup-compatibility/2006">
-          <mc:Choice xmlns:p14="http://schemas.microsoft.com/office/powerpoint/2010/main" Requires="p14">
+        <mc:AlternateContent xmlns:mc="http://schemas.openxmlformats.org/markup-compatibility/2006" xmlns:p14="http://schemas.microsoft.com/office/powerpoint/2010/main">
+          <mc:Choice Requires="p14">
             <p:contentPart p14:bwMode="auto" r:id="rId124">
               <p14:nvContentPartPr>
                 <p14:cNvPr id="172" name="Tinta 171">
@@ -11144,7 +11208,7 @@
               </p14:xfrm>
             </p:contentPart>
           </mc:Choice>
-          <mc:Fallback>
+          <mc:Fallback xmlns="">
             <p:pic>
               <p:nvPicPr>
                 <p:cNvPr id="172" name="Tinta 171">

</xml_diff>